<commit_message>
Incremental improvements for existing scripts, Map features updated and added.
</commit_message>
<xml_diff>
--- a/FYP Interim Slide Templates.pptx
+++ b/FYP Interim Slide Templates.pptx
@@ -4,6 +4,9 @@
   <p:sldMasterIdLst>
     <p:sldMasterId id="2147483648" r:id="rId1"/>
   </p:sldMasterIdLst>
+  <p:notesMasterIdLst>
+    <p:notesMasterId r:id="rId6"/>
+  </p:notesMasterIdLst>
   <p:sldIdLst>
     <p:sldId id="256" r:id="rId2"/>
     <p:sldId id="257" r:id="rId3"/>
@@ -108,6 +111,18 @@
     </a:lvl9pPr>
   </p:defaultTextStyle>
   <p:extLst>
+    <p:ext uri="{521415D9-36F7-43E2-AB2F-B90AF26B5E84}">
+      <p14:sectionLst xmlns:p14="http://schemas.microsoft.com/office/powerpoint/2010/main">
+        <p14:section name="Untitled Section" id="{755143B2-008C-47B9-8615-6B049DEE34D4}">
+          <p14:sldIdLst>
+            <p14:sldId id="256"/>
+            <p14:sldId id="257"/>
+            <p14:sldId id="258"/>
+            <p14:sldId id="259"/>
+          </p14:sldIdLst>
+        </p14:section>
+      </p14:sectionLst>
+    </p:ext>
     <p:ext uri="{EFAFB233-063F-42B5-8137-9DF3F51BA10A}">
       <p15:sldGuideLst xmlns:p15="http://schemas.microsoft.com/office/powerpoint/2012/main"/>
     </p:ext>
@@ -404,6 +419,558 @@
 </pc:chgInfo>
 </file>
 
+<file path=ppt/notesMasters/notesMaster1.xml><?xml version="1.0" encoding="utf-8"?>
+<p:notesMaster xmlns:a="http://schemas.openxmlformats.org/drawingml/2006/main" xmlns:r="http://schemas.openxmlformats.org/officeDocument/2006/relationships" xmlns:p="http://schemas.openxmlformats.org/presentationml/2006/main">
+  <p:cSld>
+    <p:bg>
+      <p:bgRef idx="1001">
+        <a:schemeClr val="bg1"/>
+      </p:bgRef>
+    </p:bg>
+    <p:spTree>
+      <p:nvGrpSpPr>
+        <p:cNvPr id="1" name=""/>
+        <p:cNvGrpSpPr/>
+        <p:nvPr/>
+      </p:nvGrpSpPr>
+      <p:grpSpPr>
+        <a:xfrm>
+          <a:off x="0" y="0"/>
+          <a:ext cx="0" cy="0"/>
+          <a:chOff x="0" y="0"/>
+          <a:chExt cx="0" cy="0"/>
+        </a:xfrm>
+      </p:grpSpPr>
+      <p:sp>
+        <p:nvSpPr>
+          <p:cNvPr id="2" name="Header Placeholder 1"/>
+          <p:cNvSpPr>
+            <a:spLocks noGrp="1"/>
+          </p:cNvSpPr>
+          <p:nvPr>
+            <p:ph type="hdr" sz="quarter"/>
+          </p:nvPr>
+        </p:nvSpPr>
+        <p:spPr>
+          <a:xfrm>
+            <a:off x="0" y="0"/>
+            <a:ext cx="2971800" cy="458788"/>
+          </a:xfrm>
+          <a:prstGeom prst="rect">
+            <a:avLst/>
+          </a:prstGeom>
+        </p:spPr>
+        <p:txBody>
+          <a:bodyPr vert="horz" lIns="91440" tIns="45720" rIns="91440" bIns="45720" rtlCol="0"/>
+          <a:lstStyle>
+            <a:lvl1pPr algn="l">
+              <a:defRPr sz="1200"/>
+            </a:lvl1pPr>
+          </a:lstStyle>
+          <a:p>
+            <a:endParaRPr lang="en-IE"/>
+          </a:p>
+        </p:txBody>
+      </p:sp>
+      <p:sp>
+        <p:nvSpPr>
+          <p:cNvPr id="3" name="Date Placeholder 2"/>
+          <p:cNvSpPr>
+            <a:spLocks noGrp="1"/>
+          </p:cNvSpPr>
+          <p:nvPr>
+            <p:ph type="dt" idx="1"/>
+          </p:nvPr>
+        </p:nvSpPr>
+        <p:spPr>
+          <a:xfrm>
+            <a:off x="3884613" y="0"/>
+            <a:ext cx="2971800" cy="458788"/>
+          </a:xfrm>
+          <a:prstGeom prst="rect">
+            <a:avLst/>
+          </a:prstGeom>
+        </p:spPr>
+        <p:txBody>
+          <a:bodyPr vert="horz" lIns="91440" tIns="45720" rIns="91440" bIns="45720" rtlCol="0"/>
+          <a:lstStyle>
+            <a:lvl1pPr algn="r">
+              <a:defRPr sz="1200"/>
+            </a:lvl1pPr>
+          </a:lstStyle>
+          <a:p>
+            <a:fld id="{505ECDB9-B6EC-47D6-982D-C80BEF8D649A}" type="datetimeFigureOut">
+              <a:rPr lang="en-IE" smtClean="0"/>
+              <a:t>11/03/2025</a:t>
+            </a:fld>
+            <a:endParaRPr lang="en-IE"/>
+          </a:p>
+        </p:txBody>
+      </p:sp>
+      <p:sp>
+        <p:nvSpPr>
+          <p:cNvPr id="4" name="Slide Image Placeholder 3"/>
+          <p:cNvSpPr>
+            <a:spLocks noGrp="1" noRot="1" noChangeAspect="1"/>
+          </p:cNvSpPr>
+          <p:nvPr>
+            <p:ph type="sldImg" idx="2"/>
+          </p:nvPr>
+        </p:nvSpPr>
+        <p:spPr>
+          <a:xfrm>
+            <a:off x="685800" y="1143000"/>
+            <a:ext cx="5486400" cy="3086100"/>
+          </a:xfrm>
+          <a:prstGeom prst="rect">
+            <a:avLst/>
+          </a:prstGeom>
+          <a:noFill/>
+          <a:ln w="12700">
+            <a:solidFill>
+              <a:prstClr val="black"/>
+            </a:solidFill>
+          </a:ln>
+        </p:spPr>
+        <p:txBody>
+          <a:bodyPr vert="horz" lIns="91440" tIns="45720" rIns="91440" bIns="45720" rtlCol="0" anchor="ctr"/>
+          <a:lstStyle/>
+          <a:p>
+            <a:endParaRPr lang="en-IE"/>
+          </a:p>
+        </p:txBody>
+      </p:sp>
+      <p:sp>
+        <p:nvSpPr>
+          <p:cNvPr id="5" name="Notes Placeholder 4"/>
+          <p:cNvSpPr>
+            <a:spLocks noGrp="1"/>
+          </p:cNvSpPr>
+          <p:nvPr>
+            <p:ph type="body" sz="quarter" idx="3"/>
+          </p:nvPr>
+        </p:nvSpPr>
+        <p:spPr>
+          <a:xfrm>
+            <a:off x="685800" y="4400550"/>
+            <a:ext cx="5486400" cy="3600450"/>
+          </a:xfrm>
+          <a:prstGeom prst="rect">
+            <a:avLst/>
+          </a:prstGeom>
+        </p:spPr>
+        <p:txBody>
+          <a:bodyPr vert="horz" lIns="91440" tIns="45720" rIns="91440" bIns="45720" rtlCol="0"/>
+          <a:lstStyle/>
+          <a:p>
+            <a:pPr lvl="0"/>
+            <a:r>
+              <a:rPr lang="en-US"/>
+              <a:t>Click to edit Master text styles</a:t>
+            </a:r>
+          </a:p>
+          <a:p>
+            <a:pPr lvl="1"/>
+            <a:r>
+              <a:rPr lang="en-US"/>
+              <a:t>Second level</a:t>
+            </a:r>
+          </a:p>
+          <a:p>
+            <a:pPr lvl="2"/>
+            <a:r>
+              <a:rPr lang="en-US"/>
+              <a:t>Third level</a:t>
+            </a:r>
+          </a:p>
+          <a:p>
+            <a:pPr lvl="3"/>
+            <a:r>
+              <a:rPr lang="en-US"/>
+              <a:t>Fourth level</a:t>
+            </a:r>
+          </a:p>
+          <a:p>
+            <a:pPr lvl="4"/>
+            <a:r>
+              <a:rPr lang="en-US"/>
+              <a:t>Fifth level</a:t>
+            </a:r>
+            <a:endParaRPr lang="en-IE"/>
+          </a:p>
+        </p:txBody>
+      </p:sp>
+      <p:sp>
+        <p:nvSpPr>
+          <p:cNvPr id="6" name="Footer Placeholder 5"/>
+          <p:cNvSpPr>
+            <a:spLocks noGrp="1"/>
+          </p:cNvSpPr>
+          <p:nvPr>
+            <p:ph type="ftr" sz="quarter" idx="4"/>
+          </p:nvPr>
+        </p:nvSpPr>
+        <p:spPr>
+          <a:xfrm>
+            <a:off x="0" y="8685213"/>
+            <a:ext cx="2971800" cy="458787"/>
+          </a:xfrm>
+          <a:prstGeom prst="rect">
+            <a:avLst/>
+          </a:prstGeom>
+        </p:spPr>
+        <p:txBody>
+          <a:bodyPr vert="horz" lIns="91440" tIns="45720" rIns="91440" bIns="45720" rtlCol="0" anchor="b"/>
+          <a:lstStyle>
+            <a:lvl1pPr algn="l">
+              <a:defRPr sz="1200"/>
+            </a:lvl1pPr>
+          </a:lstStyle>
+          <a:p>
+            <a:endParaRPr lang="en-IE"/>
+          </a:p>
+        </p:txBody>
+      </p:sp>
+      <p:sp>
+        <p:nvSpPr>
+          <p:cNvPr id="7" name="Slide Number Placeholder 6"/>
+          <p:cNvSpPr>
+            <a:spLocks noGrp="1"/>
+          </p:cNvSpPr>
+          <p:nvPr>
+            <p:ph type="sldNum" sz="quarter" idx="5"/>
+          </p:nvPr>
+        </p:nvSpPr>
+        <p:spPr>
+          <a:xfrm>
+            <a:off x="3884613" y="8685213"/>
+            <a:ext cx="2971800" cy="458787"/>
+          </a:xfrm>
+          <a:prstGeom prst="rect">
+            <a:avLst/>
+          </a:prstGeom>
+        </p:spPr>
+        <p:txBody>
+          <a:bodyPr vert="horz" lIns="91440" tIns="45720" rIns="91440" bIns="45720" rtlCol="0" anchor="b"/>
+          <a:lstStyle>
+            <a:lvl1pPr algn="r">
+              <a:defRPr sz="1200"/>
+            </a:lvl1pPr>
+          </a:lstStyle>
+          <a:p>
+            <a:fld id="{9D04F7E3-3114-4FAF-BE01-EF6F3A31EEA1}" type="slidenum">
+              <a:rPr lang="en-IE" smtClean="0"/>
+              <a:t>‹#›</a:t>
+            </a:fld>
+            <a:endParaRPr lang="en-IE"/>
+          </a:p>
+        </p:txBody>
+      </p:sp>
+    </p:spTree>
+    <p:extLst>
+      <p:ext uri="{BB962C8B-B14F-4D97-AF65-F5344CB8AC3E}">
+        <p14:creationId xmlns:p14="http://schemas.microsoft.com/office/powerpoint/2010/main" val="3558032223"/>
+      </p:ext>
+    </p:extLst>
+  </p:cSld>
+  <p:clrMap bg1="lt1" tx1="dk1" bg2="lt2" tx2="dk2" accent1="accent1" accent2="accent2" accent3="accent3" accent4="accent4" accent5="accent5" accent6="accent6" hlink="hlink" folHlink="folHlink"/>
+  <p:notesStyle>
+    <a:lvl1pPr marL="0" algn="l" defTabSz="914400" rtl="0" eaLnBrk="1" latinLnBrk="0" hangingPunct="1">
+      <a:defRPr sz="1200" kern="1200">
+        <a:solidFill>
+          <a:schemeClr val="tx1"/>
+        </a:solidFill>
+        <a:latin typeface="+mn-lt"/>
+        <a:ea typeface="+mn-ea"/>
+        <a:cs typeface="+mn-cs"/>
+      </a:defRPr>
+    </a:lvl1pPr>
+    <a:lvl2pPr marL="457200" algn="l" defTabSz="914400" rtl="0" eaLnBrk="1" latinLnBrk="0" hangingPunct="1">
+      <a:defRPr sz="1200" kern="1200">
+        <a:solidFill>
+          <a:schemeClr val="tx1"/>
+        </a:solidFill>
+        <a:latin typeface="+mn-lt"/>
+        <a:ea typeface="+mn-ea"/>
+        <a:cs typeface="+mn-cs"/>
+      </a:defRPr>
+    </a:lvl2pPr>
+    <a:lvl3pPr marL="914400" algn="l" defTabSz="914400" rtl="0" eaLnBrk="1" latinLnBrk="0" hangingPunct="1">
+      <a:defRPr sz="1200" kern="1200">
+        <a:solidFill>
+          <a:schemeClr val="tx1"/>
+        </a:solidFill>
+        <a:latin typeface="+mn-lt"/>
+        <a:ea typeface="+mn-ea"/>
+        <a:cs typeface="+mn-cs"/>
+      </a:defRPr>
+    </a:lvl3pPr>
+    <a:lvl4pPr marL="1371600" algn="l" defTabSz="914400" rtl="0" eaLnBrk="1" latinLnBrk="0" hangingPunct="1">
+      <a:defRPr sz="1200" kern="1200">
+        <a:solidFill>
+          <a:schemeClr val="tx1"/>
+        </a:solidFill>
+        <a:latin typeface="+mn-lt"/>
+        <a:ea typeface="+mn-ea"/>
+        <a:cs typeface="+mn-cs"/>
+      </a:defRPr>
+    </a:lvl4pPr>
+    <a:lvl5pPr marL="1828800" algn="l" defTabSz="914400" rtl="0" eaLnBrk="1" latinLnBrk="0" hangingPunct="1">
+      <a:defRPr sz="1200" kern="1200">
+        <a:solidFill>
+          <a:schemeClr val="tx1"/>
+        </a:solidFill>
+        <a:latin typeface="+mn-lt"/>
+        <a:ea typeface="+mn-ea"/>
+        <a:cs typeface="+mn-cs"/>
+      </a:defRPr>
+    </a:lvl5pPr>
+    <a:lvl6pPr marL="2286000" algn="l" defTabSz="914400" rtl="0" eaLnBrk="1" latinLnBrk="0" hangingPunct="1">
+      <a:defRPr sz="1200" kern="1200">
+        <a:solidFill>
+          <a:schemeClr val="tx1"/>
+        </a:solidFill>
+        <a:latin typeface="+mn-lt"/>
+        <a:ea typeface="+mn-ea"/>
+        <a:cs typeface="+mn-cs"/>
+      </a:defRPr>
+    </a:lvl6pPr>
+    <a:lvl7pPr marL="2743200" algn="l" defTabSz="914400" rtl="0" eaLnBrk="1" latinLnBrk="0" hangingPunct="1">
+      <a:defRPr sz="1200" kern="1200">
+        <a:solidFill>
+          <a:schemeClr val="tx1"/>
+        </a:solidFill>
+        <a:latin typeface="+mn-lt"/>
+        <a:ea typeface="+mn-ea"/>
+        <a:cs typeface="+mn-cs"/>
+      </a:defRPr>
+    </a:lvl7pPr>
+    <a:lvl8pPr marL="3200400" algn="l" defTabSz="914400" rtl="0" eaLnBrk="1" latinLnBrk="0" hangingPunct="1">
+      <a:defRPr sz="1200" kern="1200">
+        <a:solidFill>
+          <a:schemeClr val="tx1"/>
+        </a:solidFill>
+        <a:latin typeface="+mn-lt"/>
+        <a:ea typeface="+mn-ea"/>
+        <a:cs typeface="+mn-cs"/>
+      </a:defRPr>
+    </a:lvl8pPr>
+    <a:lvl9pPr marL="3657600" algn="l" defTabSz="914400" rtl="0" eaLnBrk="1" latinLnBrk="0" hangingPunct="1">
+      <a:defRPr sz="1200" kern="1200">
+        <a:solidFill>
+          <a:schemeClr val="tx1"/>
+        </a:solidFill>
+        <a:latin typeface="+mn-lt"/>
+        <a:ea typeface="+mn-ea"/>
+        <a:cs typeface="+mn-cs"/>
+      </a:defRPr>
+    </a:lvl9pPr>
+  </p:notesStyle>
+</p:notesMaster>
+</file>
+
+<file path=ppt/notesSlides/notesSlide1.xml><?xml version="1.0" encoding="utf-8"?>
+<p:notes xmlns:a="http://schemas.openxmlformats.org/drawingml/2006/main" xmlns:r="http://schemas.openxmlformats.org/officeDocument/2006/relationships" xmlns:p="http://schemas.openxmlformats.org/presentationml/2006/main">
+  <p:cSld>
+    <p:spTree>
+      <p:nvGrpSpPr>
+        <p:cNvPr id="1" name=""/>
+        <p:cNvGrpSpPr/>
+        <p:nvPr/>
+      </p:nvGrpSpPr>
+      <p:grpSpPr>
+        <a:xfrm>
+          <a:off x="0" y="0"/>
+          <a:ext cx="0" cy="0"/>
+          <a:chOff x="0" y="0"/>
+          <a:chExt cx="0" cy="0"/>
+        </a:xfrm>
+      </p:grpSpPr>
+      <p:sp>
+        <p:nvSpPr>
+          <p:cNvPr id="2" name="Slide Image Placeholder 1"/>
+          <p:cNvSpPr>
+            <a:spLocks noGrp="1" noRot="1" noChangeAspect="1"/>
+          </p:cNvSpPr>
+          <p:nvPr>
+            <p:ph type="sldImg"/>
+          </p:nvPr>
+        </p:nvSpPr>
+        <p:spPr/>
+      </p:sp>
+      <p:sp>
+        <p:nvSpPr>
+          <p:cNvPr id="3" name="Notes Placeholder 2"/>
+          <p:cNvSpPr>
+            <a:spLocks noGrp="1"/>
+          </p:cNvSpPr>
+          <p:nvPr>
+            <p:ph type="body" idx="1"/>
+          </p:nvPr>
+        </p:nvSpPr>
+        <p:spPr/>
+        <p:txBody>
+          <a:bodyPr/>
+          <a:lstStyle/>
+          <a:p>
+            <a:r>
+              <a:rPr lang="en-IE" dirty="0"/>
+              <a:t>Shortest Path First(Dijkstra’s) algorithm. Looks for the path to the destination that traverses the least amount of nodes.</a:t>
+            </a:r>
+          </a:p>
+          <a:p>
+            <a:r>
+              <a:rPr lang="en-IE" dirty="0"/>
+              <a:t>A* Algorithm = </a:t>
+            </a:r>
+          </a:p>
+          <a:p>
+            <a:r>
+              <a:rPr lang="en-IE" dirty="0"/>
+              <a:t>Already existing routes are: Devil’s Ladder Route, Br. </a:t>
+            </a:r>
+            <a:r>
+              <a:rPr lang="en-IE" dirty="0" err="1"/>
+              <a:t>O’Sheas</a:t>
+            </a:r>
+            <a:r>
+              <a:rPr lang="en-IE" dirty="0"/>
+              <a:t> Gully Route and </a:t>
+            </a:r>
+            <a:r>
+              <a:rPr lang="en-IE" dirty="0" err="1"/>
+              <a:t>Caher</a:t>
+            </a:r>
+            <a:r>
+              <a:rPr lang="en-IE" dirty="0"/>
+              <a:t> Route.</a:t>
+            </a:r>
+          </a:p>
+        </p:txBody>
+      </p:sp>
+      <p:sp>
+        <p:nvSpPr>
+          <p:cNvPr id="4" name="Slide Number Placeholder 3"/>
+          <p:cNvSpPr>
+            <a:spLocks noGrp="1"/>
+          </p:cNvSpPr>
+          <p:nvPr>
+            <p:ph type="sldNum" sz="quarter" idx="5"/>
+          </p:nvPr>
+        </p:nvSpPr>
+        <p:spPr/>
+        <p:txBody>
+          <a:bodyPr/>
+          <a:lstStyle/>
+          <a:p>
+            <a:fld id="{9D04F7E3-3114-4FAF-BE01-EF6F3A31EEA1}" type="slidenum">
+              <a:rPr lang="en-IE" smtClean="0"/>
+              <a:t>2</a:t>
+            </a:fld>
+            <a:endParaRPr lang="en-IE"/>
+          </a:p>
+        </p:txBody>
+      </p:sp>
+    </p:spTree>
+    <p:extLst>
+      <p:ext uri="{BB962C8B-B14F-4D97-AF65-F5344CB8AC3E}">
+        <p14:creationId xmlns:p14="http://schemas.microsoft.com/office/powerpoint/2010/main" val="2529327211"/>
+      </p:ext>
+    </p:extLst>
+  </p:cSld>
+  <p:clrMapOvr>
+    <a:masterClrMapping/>
+  </p:clrMapOvr>
+</p:notes>
+</file>
+
+<file path=ppt/notesSlides/notesSlide2.xml><?xml version="1.0" encoding="utf-8"?>
+<p:notes xmlns:a="http://schemas.openxmlformats.org/drawingml/2006/main" xmlns:r="http://schemas.openxmlformats.org/officeDocument/2006/relationships" xmlns:p="http://schemas.openxmlformats.org/presentationml/2006/main">
+  <p:cSld>
+    <p:spTree>
+      <p:nvGrpSpPr>
+        <p:cNvPr id="1" name=""/>
+        <p:cNvGrpSpPr/>
+        <p:nvPr/>
+      </p:nvGrpSpPr>
+      <p:grpSpPr>
+        <a:xfrm>
+          <a:off x="0" y="0"/>
+          <a:ext cx="0" cy="0"/>
+          <a:chOff x="0" y="0"/>
+          <a:chExt cx="0" cy="0"/>
+        </a:xfrm>
+      </p:grpSpPr>
+      <p:sp>
+        <p:nvSpPr>
+          <p:cNvPr id="2" name="Slide Image Placeholder 1"/>
+          <p:cNvSpPr>
+            <a:spLocks noGrp="1" noRot="1" noChangeAspect="1"/>
+          </p:cNvSpPr>
+          <p:nvPr>
+            <p:ph type="sldImg"/>
+          </p:nvPr>
+        </p:nvSpPr>
+        <p:spPr/>
+      </p:sp>
+      <p:sp>
+        <p:nvSpPr>
+          <p:cNvPr id="3" name="Notes Placeholder 2"/>
+          <p:cNvSpPr>
+            <a:spLocks noGrp="1"/>
+          </p:cNvSpPr>
+          <p:nvPr>
+            <p:ph type="body" idx="1"/>
+          </p:nvPr>
+        </p:nvSpPr>
+        <p:spPr/>
+        <p:txBody>
+          <a:bodyPr/>
+          <a:lstStyle/>
+          <a:p>
+            <a:r>
+              <a:rPr lang="en-IE" dirty="0"/>
+              <a:t>Sorry about correcting the full stop at the start of this. I DO NOT sign off on grammatical errors. Not happening.</a:t>
+            </a:r>
+          </a:p>
+        </p:txBody>
+      </p:sp>
+      <p:sp>
+        <p:nvSpPr>
+          <p:cNvPr id="4" name="Slide Number Placeholder 3"/>
+          <p:cNvSpPr>
+            <a:spLocks noGrp="1"/>
+          </p:cNvSpPr>
+          <p:nvPr>
+            <p:ph type="sldNum" sz="quarter" idx="5"/>
+          </p:nvPr>
+        </p:nvSpPr>
+        <p:spPr/>
+        <p:txBody>
+          <a:bodyPr/>
+          <a:lstStyle/>
+          <a:p>
+            <a:fld id="{9D04F7E3-3114-4FAF-BE01-EF6F3A31EEA1}" type="slidenum">
+              <a:rPr lang="en-IE" smtClean="0"/>
+              <a:t>3</a:t>
+            </a:fld>
+            <a:endParaRPr lang="en-IE"/>
+          </a:p>
+        </p:txBody>
+      </p:sp>
+    </p:spTree>
+    <p:extLst>
+      <p:ext uri="{BB962C8B-B14F-4D97-AF65-F5344CB8AC3E}">
+        <p14:creationId xmlns:p14="http://schemas.microsoft.com/office/powerpoint/2010/main" val="2216274303"/>
+      </p:ext>
+    </p:extLst>
+  </p:cSld>
+  <p:clrMapOvr>
+    <a:masterClrMapping/>
+  </p:clrMapOvr>
+</p:notes>
+</file>
+
 <file path=ppt/slideLayouts/slideLayout1.xml><?xml version="1.0" encoding="utf-8"?>
 <p:sldLayout xmlns:a="http://schemas.openxmlformats.org/drawingml/2006/main" xmlns:r="http://schemas.openxmlformats.org/officeDocument/2006/relationships" xmlns:p="http://schemas.openxmlformats.org/presentationml/2006/main" type="title" preserve="1">
   <p:cSld name="Title Slide">
@@ -553,7 +1120,7 @@
           <a:p>
             <a:fld id="{EF482A1D-883F-4C2B-94E0-8A5AA1619226}" type="datetimeFigureOut">
               <a:rPr lang="en-IE" smtClean="0"/>
-              <a:t>06/03/2025</a:t>
+              <a:t>11/03/2025</a:t>
             </a:fld>
             <a:endParaRPr lang="en-IE"/>
           </a:p>
@@ -753,7 +1320,7 @@
           <a:p>
             <a:fld id="{EF482A1D-883F-4C2B-94E0-8A5AA1619226}" type="datetimeFigureOut">
               <a:rPr lang="en-IE" smtClean="0"/>
-              <a:t>06/03/2025</a:t>
+              <a:t>11/03/2025</a:t>
             </a:fld>
             <a:endParaRPr lang="en-IE"/>
           </a:p>
@@ -963,7 +1530,7 @@
           <a:p>
             <a:fld id="{EF482A1D-883F-4C2B-94E0-8A5AA1619226}" type="datetimeFigureOut">
               <a:rPr lang="en-IE" smtClean="0"/>
-              <a:t>06/03/2025</a:t>
+              <a:t>11/03/2025</a:t>
             </a:fld>
             <a:endParaRPr lang="en-IE"/>
           </a:p>
@@ -1163,7 +1730,7 @@
           <a:p>
             <a:fld id="{EF482A1D-883F-4C2B-94E0-8A5AA1619226}" type="datetimeFigureOut">
               <a:rPr lang="en-IE" smtClean="0"/>
-              <a:t>06/03/2025</a:t>
+              <a:t>11/03/2025</a:t>
             </a:fld>
             <a:endParaRPr lang="en-IE"/>
           </a:p>
@@ -1439,7 +2006,7 @@
           <a:p>
             <a:fld id="{EF482A1D-883F-4C2B-94E0-8A5AA1619226}" type="datetimeFigureOut">
               <a:rPr lang="en-IE" smtClean="0"/>
-              <a:t>06/03/2025</a:t>
+              <a:t>11/03/2025</a:t>
             </a:fld>
             <a:endParaRPr lang="en-IE"/>
           </a:p>
@@ -1707,7 +2274,7 @@
           <a:p>
             <a:fld id="{EF482A1D-883F-4C2B-94E0-8A5AA1619226}" type="datetimeFigureOut">
               <a:rPr lang="en-IE" smtClean="0"/>
-              <a:t>06/03/2025</a:t>
+              <a:t>11/03/2025</a:t>
             </a:fld>
             <a:endParaRPr lang="en-IE"/>
           </a:p>
@@ -2122,7 +2689,7 @@
           <a:p>
             <a:fld id="{EF482A1D-883F-4C2B-94E0-8A5AA1619226}" type="datetimeFigureOut">
               <a:rPr lang="en-IE" smtClean="0"/>
-              <a:t>06/03/2025</a:t>
+              <a:t>11/03/2025</a:t>
             </a:fld>
             <a:endParaRPr lang="en-IE"/>
           </a:p>
@@ -2264,7 +2831,7 @@
           <a:p>
             <a:fld id="{EF482A1D-883F-4C2B-94E0-8A5AA1619226}" type="datetimeFigureOut">
               <a:rPr lang="en-IE" smtClean="0"/>
-              <a:t>06/03/2025</a:t>
+              <a:t>11/03/2025</a:t>
             </a:fld>
             <a:endParaRPr lang="en-IE"/>
           </a:p>
@@ -2377,7 +2944,7 @@
           <a:p>
             <a:fld id="{EF482A1D-883F-4C2B-94E0-8A5AA1619226}" type="datetimeFigureOut">
               <a:rPr lang="en-IE" smtClean="0"/>
-              <a:t>06/03/2025</a:t>
+              <a:t>11/03/2025</a:t>
             </a:fld>
             <a:endParaRPr lang="en-IE"/>
           </a:p>
@@ -2690,7 +3257,7 @@
           <a:p>
             <a:fld id="{EF482A1D-883F-4C2B-94E0-8A5AA1619226}" type="datetimeFigureOut">
               <a:rPr lang="en-IE" smtClean="0"/>
-              <a:t>06/03/2025</a:t>
+              <a:t>11/03/2025</a:t>
             </a:fld>
             <a:endParaRPr lang="en-IE"/>
           </a:p>
@@ -2979,7 +3546,7 @@
           <a:p>
             <a:fld id="{EF482A1D-883F-4C2B-94E0-8A5AA1619226}" type="datetimeFigureOut">
               <a:rPr lang="en-IE" smtClean="0"/>
-              <a:t>06/03/2025</a:t>
+              <a:t>11/03/2025</a:t>
             </a:fld>
             <a:endParaRPr lang="en-IE"/>
           </a:p>
@@ -3222,7 +3789,7 @@
           <a:p>
             <a:fld id="{EF482A1D-883F-4C2B-94E0-8A5AA1619226}" type="datetimeFigureOut">
               <a:rPr lang="en-IE" smtClean="0"/>
-              <a:t>06/03/2025</a:t>
+              <a:t>11/03/2025</a:t>
             </a:fld>
             <a:endParaRPr lang="en-IE"/>
           </a:p>
@@ -3737,8 +4304,15 @@
           <a:p>
             <a:pPr algn="l"/>
             <a:r>
-              <a:rPr lang="en-IE" sz="5400"/>
-              <a:t>Student Name</a:t>
+              <a:rPr lang="en-IE" sz="5400" dirty="0"/>
+              <a:t>T00158237</a:t>
+            </a:r>
+            <a:br>
+              <a:rPr lang="en-IE" sz="5400" dirty="0"/>
+            </a:br>
+            <a:r>
+              <a:rPr lang="en-IE" sz="5400" dirty="0"/>
+              <a:t>Daniel Jameson</a:t>
             </a:r>
           </a:p>
         </p:txBody>
@@ -4127,45 +4701,138 @@
           </a:p>
         </p:txBody>
       </p:sp>
-      <p:pic>
-        <p:nvPicPr>
-          <p:cNvPr id="7" name="Graphic 6" descr="User">
-            <a:extLst>
-              <a:ext uri="{FF2B5EF4-FFF2-40B4-BE49-F238E27FC236}">
-                <a16:creationId xmlns:a16="http://schemas.microsoft.com/office/drawing/2014/main" id="{BC29C971-5F55-5519-A754-5D1993D01CFE}"/>
-              </a:ext>
-            </a:extLst>
-          </p:cNvPr>
-          <p:cNvPicPr>
-            <a:picLocks noChangeAspect="1"/>
-          </p:cNvPicPr>
+      <p:sp>
+        <p:nvSpPr>
+          <p:cNvPr id="4" name="TextBox 3">
+            <a:extLst>
+              <a:ext uri="{FF2B5EF4-FFF2-40B4-BE49-F238E27FC236}">
+                <a16:creationId xmlns:a16="http://schemas.microsoft.com/office/drawing/2014/main" id="{98199FD1-F4A4-A146-BCFB-7040A904423B}"/>
+              </a:ext>
+            </a:extLst>
+          </p:cNvPr>
+          <p:cNvSpPr txBox="1"/>
           <p:nvPr/>
-        </p:nvPicPr>
-        <p:blipFill>
-          <a:blip r:embed="rId2">
-            <a:extLst>
-              <a:ext uri="{28A0092B-C50C-407E-A947-70E740481C1C}">
-                <a14:useLocalDpi xmlns:a14="http://schemas.microsoft.com/office/drawing/2010/main" val="0"/>
-              </a:ext>
-              <a:ext uri="{96DAC541-7B7A-43D3-8B79-37D633B846F1}">
-                <asvg:svgBlip xmlns:asvg="http://schemas.microsoft.com/office/drawing/2016/SVG/main" r:embed="rId3"/>
-              </a:ext>
-            </a:extLst>
-          </a:blip>
-          <a:stretch>
-            <a:fillRect/>
-          </a:stretch>
-        </p:blipFill>
+        </p:nvSpPr>
         <p:spPr>
           <a:xfrm>
-            <a:off x="5957597" y="666728"/>
-            <a:ext cx="5465791" cy="5465791"/>
+            <a:off x="6143407" y="1736672"/>
+            <a:ext cx="5449496" cy="3170099"/>
           </a:xfrm>
           <a:prstGeom prst="rect">
             <a:avLst/>
           </a:prstGeom>
+          <a:noFill/>
         </p:spPr>
-      </p:pic>
+        <p:txBody>
+          <a:bodyPr wrap="square" rtlCol="0">
+            <a:spAutoFit/>
+          </a:bodyPr>
+          <a:lstStyle>
+            <a:defPPr>
+              <a:defRPr lang="en-US"/>
+            </a:defPPr>
+            <a:lvl1pPr marL="0" algn="l" defTabSz="914400" rtl="0" eaLnBrk="1" latinLnBrk="0" hangingPunct="1">
+              <a:defRPr sz="1800" kern="1200">
+                <a:solidFill>
+                  <a:schemeClr val="tx1"/>
+                </a:solidFill>
+                <a:latin typeface="+mn-lt"/>
+                <a:ea typeface="+mn-ea"/>
+                <a:cs typeface="+mn-cs"/>
+              </a:defRPr>
+            </a:lvl1pPr>
+            <a:lvl2pPr marL="457200" algn="l" defTabSz="914400" rtl="0" eaLnBrk="1" latinLnBrk="0" hangingPunct="1">
+              <a:defRPr sz="1800" kern="1200">
+                <a:solidFill>
+                  <a:schemeClr val="tx1"/>
+                </a:solidFill>
+                <a:latin typeface="+mn-lt"/>
+                <a:ea typeface="+mn-ea"/>
+                <a:cs typeface="+mn-cs"/>
+              </a:defRPr>
+            </a:lvl2pPr>
+            <a:lvl3pPr marL="914400" algn="l" defTabSz="914400" rtl="0" eaLnBrk="1" latinLnBrk="0" hangingPunct="1">
+              <a:defRPr sz="1800" kern="1200">
+                <a:solidFill>
+                  <a:schemeClr val="tx1"/>
+                </a:solidFill>
+                <a:latin typeface="+mn-lt"/>
+                <a:ea typeface="+mn-ea"/>
+                <a:cs typeface="+mn-cs"/>
+              </a:defRPr>
+            </a:lvl3pPr>
+            <a:lvl4pPr marL="1371600" algn="l" defTabSz="914400" rtl="0" eaLnBrk="1" latinLnBrk="0" hangingPunct="1">
+              <a:defRPr sz="1800" kern="1200">
+                <a:solidFill>
+                  <a:schemeClr val="tx1"/>
+                </a:solidFill>
+                <a:latin typeface="+mn-lt"/>
+                <a:ea typeface="+mn-ea"/>
+                <a:cs typeface="+mn-cs"/>
+              </a:defRPr>
+            </a:lvl4pPr>
+            <a:lvl5pPr marL="1828800" algn="l" defTabSz="914400" rtl="0" eaLnBrk="1" latinLnBrk="0" hangingPunct="1">
+              <a:defRPr sz="1800" kern="1200">
+                <a:solidFill>
+                  <a:schemeClr val="tx1"/>
+                </a:solidFill>
+                <a:latin typeface="+mn-lt"/>
+                <a:ea typeface="+mn-ea"/>
+                <a:cs typeface="+mn-cs"/>
+              </a:defRPr>
+            </a:lvl5pPr>
+            <a:lvl6pPr marL="2286000" algn="l" defTabSz="914400" rtl="0" eaLnBrk="1" latinLnBrk="0" hangingPunct="1">
+              <a:defRPr sz="1800" kern="1200">
+                <a:solidFill>
+                  <a:schemeClr val="tx1"/>
+                </a:solidFill>
+                <a:latin typeface="+mn-lt"/>
+                <a:ea typeface="+mn-ea"/>
+                <a:cs typeface="+mn-cs"/>
+              </a:defRPr>
+            </a:lvl6pPr>
+            <a:lvl7pPr marL="2743200" algn="l" defTabSz="914400" rtl="0" eaLnBrk="1" latinLnBrk="0" hangingPunct="1">
+              <a:defRPr sz="1800" kern="1200">
+                <a:solidFill>
+                  <a:schemeClr val="tx1"/>
+                </a:solidFill>
+                <a:latin typeface="+mn-lt"/>
+                <a:ea typeface="+mn-ea"/>
+                <a:cs typeface="+mn-cs"/>
+              </a:defRPr>
+            </a:lvl7pPr>
+            <a:lvl8pPr marL="3200400" algn="l" defTabSz="914400" rtl="0" eaLnBrk="1" latinLnBrk="0" hangingPunct="1">
+              <a:defRPr sz="1800" kern="1200">
+                <a:solidFill>
+                  <a:schemeClr val="tx1"/>
+                </a:solidFill>
+                <a:latin typeface="+mn-lt"/>
+                <a:ea typeface="+mn-ea"/>
+                <a:cs typeface="+mn-cs"/>
+              </a:defRPr>
+            </a:lvl8pPr>
+            <a:lvl9pPr marL="3657600" algn="l" defTabSz="914400" rtl="0" eaLnBrk="1" latinLnBrk="0" hangingPunct="1">
+              <a:defRPr sz="1800" kern="1200">
+                <a:solidFill>
+                  <a:schemeClr val="tx1"/>
+                </a:solidFill>
+                <a:latin typeface="+mn-lt"/>
+                <a:ea typeface="+mn-ea"/>
+                <a:cs typeface="+mn-cs"/>
+              </a:defRPr>
+            </a:lvl9pPr>
+          </a:lstStyle>
+          <a:p>
+            <a:r>
+              <a:rPr lang="en-GB" sz="4000" dirty="0">
+                <a:latin typeface="Times New Roman" panose="02020603050405020304" pitchFamily="18" charset="0"/>
+                <a:cs typeface="Times New Roman" panose="02020603050405020304" pitchFamily="18" charset="0"/>
+              </a:rPr>
+              <a:t>Using Modern Mapping and Graph implementations to enhance mountain traversal.</a:t>
+            </a:r>
+          </a:p>
+        </p:txBody>
+      </p:sp>
     </p:spTree>
     <p:extLst>
       <p:ext uri="{BB962C8B-B14F-4D97-AF65-F5344CB8AC3E}">
@@ -4609,7 +5276,28 @@
           </a:bodyPr>
           <a:lstStyle/>
           <a:p>
-            <a:endParaRPr lang="en-IE" sz="2400"/>
+            <a:r>
+              <a:rPr lang="en-IE" sz="2400" dirty="0"/>
+              <a:t>Reusability added to existing code, now users can generate their own data set, with an API key.</a:t>
+            </a:r>
+          </a:p>
+          <a:p>
+            <a:r>
+              <a:rPr lang="en-IE" sz="2400" dirty="0"/>
+              <a:t>Mapping techniques work on basic level, the summit can be reached using Shortest Path First.</a:t>
+            </a:r>
+          </a:p>
+          <a:p>
+            <a:r>
+              <a:rPr lang="en-IE" sz="2400" dirty="0"/>
+              <a:t>Already existing path data has been added to the map.</a:t>
+            </a:r>
+          </a:p>
+          <a:p>
+            <a:r>
+              <a:rPr lang="en-IE" sz="2400" dirty="0"/>
+              <a:t>Old routes have been overlayed on top of created paths with algorithms.</a:t>
+            </a:r>
           </a:p>
         </p:txBody>
       </p:sp>
@@ -5074,8 +5762,8 @@
           <a:lstStyle/>
           <a:p>
             <a:r>
-              <a:rPr lang="en-IE" sz="4800"/>
-              <a:t>What is left to do.</a:t>
+              <a:rPr lang="en-IE" sz="4800" dirty="0"/>
+              <a:t>What is left to do?</a:t>
             </a:r>
           </a:p>
         </p:txBody>
@@ -5108,7 +5796,16 @@
           </a:bodyPr>
           <a:lstStyle/>
           <a:p>
-            <a:endParaRPr lang="en-IE" sz="2400"/>
+            <a:r>
+              <a:rPr lang="en-IE" sz="2400" dirty="0"/>
+              <a:t>Continue with mapping, add other possible use cases, such as hardest routes first.</a:t>
+            </a:r>
+          </a:p>
+          <a:p>
+            <a:r>
+              <a:rPr lang="en-IE" sz="2400" dirty="0"/>
+              <a:t>Build a Web Application to display the map, mobile first, because portability is a major factor.</a:t>
+            </a:r>
           </a:p>
         </p:txBody>
       </p:sp>
@@ -5607,7 +6304,28 @@
           </a:bodyPr>
           <a:lstStyle/>
           <a:p>
-            <a:endParaRPr lang="en-IE" sz="2400"/>
+            <a:r>
+              <a:rPr lang="en-IE" sz="2400" dirty="0"/>
+              <a:t>This project is less unique than I thought when I made it.</a:t>
+            </a:r>
+          </a:p>
+          <a:p>
+            <a:r>
+              <a:rPr lang="en-IE" sz="2400" dirty="0"/>
+              <a:t>There is a high cost associated with gathering a suitable dataset, gathering data has stability issues.</a:t>
+            </a:r>
+          </a:p>
+          <a:p>
+            <a:r>
+              <a:rPr lang="en-IE" sz="2400" dirty="0"/>
+              <a:t>Needs to be transferred to a portable application type, such as mobile.</a:t>
+            </a:r>
+          </a:p>
+          <a:p>
+            <a:r>
+              <a:rPr lang="en-IE" sz="2400" dirty="0"/>
+              <a:t>More adaptability is desirable, such as wind direction, weather etc.</a:t>
+            </a:r>
           </a:p>
         </p:txBody>
       </p:sp>
@@ -5989,4 +6707,319 @@
     </a:ext>
   </a:extLst>
 </a:theme>
+</file>
+
+<file path=ppt/theme/theme2.xml><?xml version="1.0" encoding="utf-8"?>
+<a:theme xmlns:a="http://schemas.openxmlformats.org/drawingml/2006/main" name="Office Theme">
+  <a:themeElements>
+    <a:clrScheme name="Office">
+      <a:dk1>
+        <a:sysClr val="windowText" lastClr="000000"/>
+      </a:dk1>
+      <a:lt1>
+        <a:sysClr val="window" lastClr="FFFFFF"/>
+      </a:lt1>
+      <a:dk2>
+        <a:srgbClr val="0E2841"/>
+      </a:dk2>
+      <a:lt2>
+        <a:srgbClr val="E8E8E8"/>
+      </a:lt2>
+      <a:accent1>
+        <a:srgbClr val="156082"/>
+      </a:accent1>
+      <a:accent2>
+        <a:srgbClr val="E97132"/>
+      </a:accent2>
+      <a:accent3>
+        <a:srgbClr val="196B24"/>
+      </a:accent3>
+      <a:accent4>
+        <a:srgbClr val="0F9ED5"/>
+      </a:accent4>
+      <a:accent5>
+        <a:srgbClr val="A02B93"/>
+      </a:accent5>
+      <a:accent6>
+        <a:srgbClr val="4EA72E"/>
+      </a:accent6>
+      <a:hlink>
+        <a:srgbClr val="467886"/>
+      </a:hlink>
+      <a:folHlink>
+        <a:srgbClr val="96607D"/>
+      </a:folHlink>
+    </a:clrScheme>
+    <a:fontScheme name="Office">
+      <a:majorFont>
+        <a:latin typeface="Aptos Display" panose="02110004020202020204"/>
+        <a:ea typeface=""/>
+        <a:cs typeface=""/>
+        <a:font script="Jpan" typeface="游ゴシック Light"/>
+        <a:font script="Hang" typeface="맑은 고딕"/>
+        <a:font script="Hans" typeface="等线 Light"/>
+        <a:font script="Hant" typeface="新細明體"/>
+        <a:font script="Arab" typeface="Times New Roman"/>
+        <a:font script="Hebr" typeface="Times New Roman"/>
+        <a:font script="Thai" typeface="Angsana New"/>
+        <a:font script="Ethi" typeface="Nyala"/>
+        <a:font script="Beng" typeface="Vrinda"/>
+        <a:font script="Gujr" typeface="Shruti"/>
+        <a:font script="Khmr" typeface="MoolBoran"/>
+        <a:font script="Knda" typeface="Tunga"/>
+        <a:font script="Guru" typeface="Raavi"/>
+        <a:font script="Cans" typeface="Euphemia"/>
+        <a:font script="Cher" typeface="Plantagenet Cherokee"/>
+        <a:font script="Yiii" typeface="Microsoft Yi Baiti"/>
+        <a:font script="Tibt" typeface="Microsoft Himalaya"/>
+        <a:font script="Thaa" typeface="MV Boli"/>
+        <a:font script="Deva" typeface="Mangal"/>
+        <a:font script="Telu" typeface="Gautami"/>
+        <a:font script="Taml" typeface="Latha"/>
+        <a:font script="Syrc" typeface="Estrangelo Edessa"/>
+        <a:font script="Orya" typeface="Kalinga"/>
+        <a:font script="Mlym" typeface="Kartika"/>
+        <a:font script="Laoo" typeface="DokChampa"/>
+        <a:font script="Sinh" typeface="Iskoola Pota"/>
+        <a:font script="Mong" typeface="Mongolian Baiti"/>
+        <a:font script="Viet" typeface="Times New Roman"/>
+        <a:font script="Uigh" typeface="Microsoft Uighur"/>
+        <a:font script="Geor" typeface="Sylfaen"/>
+        <a:font script="Armn" typeface="Arial"/>
+        <a:font script="Bugi" typeface="Leelawadee UI"/>
+        <a:font script="Bopo" typeface="Microsoft JhengHei"/>
+        <a:font script="Java" typeface="Javanese Text"/>
+        <a:font script="Lisu" typeface="Segoe UI"/>
+        <a:font script="Mymr" typeface="Myanmar Text"/>
+        <a:font script="Nkoo" typeface="Ebrima"/>
+        <a:font script="Olck" typeface="Nirmala UI"/>
+        <a:font script="Osma" typeface="Ebrima"/>
+        <a:font script="Phag" typeface="Phagspa"/>
+        <a:font script="Syrn" typeface="Estrangelo Edessa"/>
+        <a:font script="Syrj" typeface="Estrangelo Edessa"/>
+        <a:font script="Syre" typeface="Estrangelo Edessa"/>
+        <a:font script="Sora" typeface="Nirmala UI"/>
+        <a:font script="Tale" typeface="Microsoft Tai Le"/>
+        <a:font script="Talu" typeface="Microsoft New Tai Lue"/>
+        <a:font script="Tfng" typeface="Ebrima"/>
+      </a:majorFont>
+      <a:minorFont>
+        <a:latin typeface="Aptos" panose="02110004020202020204"/>
+        <a:ea typeface=""/>
+        <a:cs typeface=""/>
+        <a:font script="Jpan" typeface="游ゴシック"/>
+        <a:font script="Hang" typeface="맑은 고딕"/>
+        <a:font script="Hans" typeface="等线"/>
+        <a:font script="Hant" typeface="新細明體"/>
+        <a:font script="Arab" typeface="Arial"/>
+        <a:font script="Hebr" typeface="Arial"/>
+        <a:font script="Thai" typeface="Cordia New"/>
+        <a:font script="Ethi" typeface="Nyala"/>
+        <a:font script="Beng" typeface="Vrinda"/>
+        <a:font script="Gujr" typeface="Shruti"/>
+        <a:font script="Khmr" typeface="DaunPenh"/>
+        <a:font script="Knda" typeface="Tunga"/>
+        <a:font script="Guru" typeface="Raavi"/>
+        <a:font script="Cans" typeface="Euphemia"/>
+        <a:font script="Cher" typeface="Plantagenet Cherokee"/>
+        <a:font script="Yiii" typeface="Microsoft Yi Baiti"/>
+        <a:font script="Tibt" typeface="Microsoft Himalaya"/>
+        <a:font script="Thaa" typeface="MV Boli"/>
+        <a:font script="Deva" typeface="Mangal"/>
+        <a:font script="Telu" typeface="Gautami"/>
+        <a:font script="Taml" typeface="Latha"/>
+        <a:font script="Syrc" typeface="Estrangelo Edessa"/>
+        <a:font script="Orya" typeface="Kalinga"/>
+        <a:font script="Mlym" typeface="Kartika"/>
+        <a:font script="Laoo" typeface="DokChampa"/>
+        <a:font script="Sinh" typeface="Iskoola Pota"/>
+        <a:font script="Mong" typeface="Mongolian Baiti"/>
+        <a:font script="Viet" typeface="Arial"/>
+        <a:font script="Uigh" typeface="Microsoft Uighur"/>
+        <a:font script="Geor" typeface="Sylfaen"/>
+        <a:font script="Armn" typeface="Arial"/>
+        <a:font script="Bugi" typeface="Leelawadee UI"/>
+        <a:font script="Bopo" typeface="Microsoft JhengHei"/>
+        <a:font script="Java" typeface="Javanese Text"/>
+        <a:font script="Lisu" typeface="Segoe UI"/>
+        <a:font script="Mymr" typeface="Myanmar Text"/>
+        <a:font script="Nkoo" typeface="Ebrima"/>
+        <a:font script="Olck" typeface="Nirmala UI"/>
+        <a:font script="Osma" typeface="Ebrima"/>
+        <a:font script="Phag" typeface="Phagspa"/>
+        <a:font script="Syrn" typeface="Estrangelo Edessa"/>
+        <a:font script="Syrj" typeface="Estrangelo Edessa"/>
+        <a:font script="Syre" typeface="Estrangelo Edessa"/>
+        <a:font script="Sora" typeface="Nirmala UI"/>
+        <a:font script="Tale" typeface="Microsoft Tai Le"/>
+        <a:font script="Talu" typeface="Microsoft New Tai Lue"/>
+        <a:font script="Tfng" typeface="Ebrima"/>
+      </a:minorFont>
+    </a:fontScheme>
+    <a:fmtScheme name="Office">
+      <a:fillStyleLst>
+        <a:solidFill>
+          <a:schemeClr val="phClr"/>
+        </a:solidFill>
+        <a:gradFill rotWithShape="1">
+          <a:gsLst>
+            <a:gs pos="0">
+              <a:schemeClr val="phClr">
+                <a:lumMod val="110000"/>
+                <a:satMod val="105000"/>
+                <a:tint val="67000"/>
+              </a:schemeClr>
+            </a:gs>
+            <a:gs pos="50000">
+              <a:schemeClr val="phClr">
+                <a:lumMod val="105000"/>
+                <a:satMod val="103000"/>
+                <a:tint val="73000"/>
+              </a:schemeClr>
+            </a:gs>
+            <a:gs pos="100000">
+              <a:schemeClr val="phClr">
+                <a:lumMod val="105000"/>
+                <a:satMod val="109000"/>
+                <a:tint val="81000"/>
+              </a:schemeClr>
+            </a:gs>
+          </a:gsLst>
+          <a:lin ang="5400000" scaled="0"/>
+        </a:gradFill>
+        <a:gradFill rotWithShape="1">
+          <a:gsLst>
+            <a:gs pos="0">
+              <a:schemeClr val="phClr">
+                <a:satMod val="103000"/>
+                <a:lumMod val="102000"/>
+                <a:tint val="94000"/>
+              </a:schemeClr>
+            </a:gs>
+            <a:gs pos="50000">
+              <a:schemeClr val="phClr">
+                <a:satMod val="110000"/>
+                <a:lumMod val="100000"/>
+                <a:shade val="100000"/>
+              </a:schemeClr>
+            </a:gs>
+            <a:gs pos="100000">
+              <a:schemeClr val="phClr">
+                <a:lumMod val="99000"/>
+                <a:satMod val="120000"/>
+                <a:shade val="78000"/>
+              </a:schemeClr>
+            </a:gs>
+          </a:gsLst>
+          <a:lin ang="5400000" scaled="0"/>
+        </a:gradFill>
+      </a:fillStyleLst>
+      <a:lnStyleLst>
+        <a:ln w="12700" cap="flat" cmpd="sng" algn="ctr">
+          <a:solidFill>
+            <a:schemeClr val="phClr"/>
+          </a:solidFill>
+          <a:prstDash val="solid"/>
+          <a:miter lim="800000"/>
+        </a:ln>
+        <a:ln w="19050" cap="flat" cmpd="sng" algn="ctr">
+          <a:solidFill>
+            <a:schemeClr val="phClr"/>
+          </a:solidFill>
+          <a:prstDash val="solid"/>
+          <a:miter lim="800000"/>
+        </a:ln>
+        <a:ln w="25400" cap="flat" cmpd="sng" algn="ctr">
+          <a:solidFill>
+            <a:schemeClr val="phClr"/>
+          </a:solidFill>
+          <a:prstDash val="solid"/>
+          <a:miter lim="800000"/>
+        </a:ln>
+      </a:lnStyleLst>
+      <a:effectStyleLst>
+        <a:effectStyle>
+          <a:effectLst/>
+        </a:effectStyle>
+        <a:effectStyle>
+          <a:effectLst/>
+        </a:effectStyle>
+        <a:effectStyle>
+          <a:effectLst>
+            <a:outerShdw blurRad="57150" dist="19050" dir="5400000" algn="ctr" rotWithShape="0">
+              <a:srgbClr val="000000">
+                <a:alpha val="63000"/>
+              </a:srgbClr>
+            </a:outerShdw>
+          </a:effectLst>
+        </a:effectStyle>
+      </a:effectStyleLst>
+      <a:bgFillStyleLst>
+        <a:solidFill>
+          <a:schemeClr val="phClr"/>
+        </a:solidFill>
+        <a:solidFill>
+          <a:schemeClr val="phClr">
+            <a:tint val="95000"/>
+            <a:satMod val="170000"/>
+          </a:schemeClr>
+        </a:solidFill>
+        <a:gradFill rotWithShape="1">
+          <a:gsLst>
+            <a:gs pos="0">
+              <a:schemeClr val="phClr">
+                <a:tint val="93000"/>
+                <a:satMod val="150000"/>
+                <a:shade val="98000"/>
+                <a:lumMod val="102000"/>
+              </a:schemeClr>
+            </a:gs>
+            <a:gs pos="50000">
+              <a:schemeClr val="phClr">
+                <a:tint val="98000"/>
+                <a:satMod val="130000"/>
+                <a:shade val="90000"/>
+                <a:lumMod val="103000"/>
+              </a:schemeClr>
+            </a:gs>
+            <a:gs pos="100000">
+              <a:schemeClr val="phClr">
+                <a:shade val="63000"/>
+                <a:satMod val="120000"/>
+              </a:schemeClr>
+            </a:gs>
+          </a:gsLst>
+          <a:lin ang="5400000" scaled="0"/>
+        </a:gradFill>
+      </a:bgFillStyleLst>
+    </a:fmtScheme>
+  </a:themeElements>
+  <a:objectDefaults>
+    <a:lnDef>
+      <a:spPr/>
+      <a:bodyPr/>
+      <a:lstStyle/>
+      <a:style>
+        <a:lnRef idx="2">
+          <a:schemeClr val="accent1"/>
+        </a:lnRef>
+        <a:fillRef idx="0">
+          <a:schemeClr val="accent1"/>
+        </a:fillRef>
+        <a:effectRef idx="1">
+          <a:schemeClr val="accent1"/>
+        </a:effectRef>
+        <a:fontRef idx="minor">
+          <a:schemeClr val="tx1"/>
+        </a:fontRef>
+      </a:style>
+    </a:lnDef>
+  </a:objectDefaults>
+  <a:extraClrSchemeLst/>
+  <a:extLst>
+    <a:ext uri="{05A4C25C-085E-4340-85A3-A5531E510DB2}">
+      <thm15:themeFamily xmlns:thm15="http://schemas.microsoft.com/office/thememl/2012/main" name="Office Theme" id="{2E142A2C-CD16-42D6-873A-C26D2A0506FA}" vid="{1BDDFF52-6CD6-40A5-AB3C-68EB2F1E4D0A}"/>
+    </a:ext>
+  </a:extLst>
+</a:theme>
 </file>
</xml_diff>